<commit_message>
Added final slides and pdfs for workshop.
</commit_message>
<xml_diff>
--- a/Slides/MiCM_GitHub_Workshop_Winter24.pptx
+++ b/Slides/MiCM_GitHub_Workshop_Winter24.pptx
@@ -2362,7 +2362,7 @@
   <pc:docChgLst>
     <pc:chgData name="Adrien Osakwe" userId="7a3e290c-eb83-484b-8e3d-d46ef2333477" providerId="ADAL" clId="{87C4268F-A9D7-4A74-8443-82093B86DEE8}"/>
     <pc:docChg chg="undo custSel addSld delSld modSld sldOrd">
-      <pc:chgData name="Adrien Osakwe" userId="7a3e290c-eb83-484b-8e3d-d46ef2333477" providerId="ADAL" clId="{87C4268F-A9D7-4A74-8443-82093B86DEE8}" dt="2024-02-09T14:21:41.750" v="1893" actId="20577"/>
+      <pc:chgData name="Adrien Osakwe" userId="7a3e290c-eb83-484b-8e3d-d46ef2333477" providerId="ADAL" clId="{87C4268F-A9D7-4A74-8443-82093B86DEE8}" dt="2024-02-09T20:23:45.761" v="1897" actId="20577"/>
       <pc:docMkLst>
         <pc:docMk/>
       </pc:docMkLst>
@@ -3179,11 +3179,19 @@
         </pc:spChg>
       </pc:sldChg>
       <pc:sldChg chg="addSp delSp modSp add mod delAnim modAnim">
-        <pc:chgData name="Adrien Osakwe" userId="7a3e290c-eb83-484b-8e3d-d46ef2333477" providerId="ADAL" clId="{87C4268F-A9D7-4A74-8443-82093B86DEE8}" dt="2024-02-09T04:16:51.932" v="1223"/>
+        <pc:chgData name="Adrien Osakwe" userId="7a3e290c-eb83-484b-8e3d-d46ef2333477" providerId="ADAL" clId="{87C4268F-A9D7-4A74-8443-82093B86DEE8}" dt="2024-02-09T20:23:45.761" v="1897" actId="20577"/>
         <pc:sldMkLst>
           <pc:docMk/>
           <pc:sldMk cId="2860464347" sldId="405"/>
         </pc:sldMkLst>
+        <pc:spChg chg="mod">
+          <ac:chgData name="Adrien Osakwe" userId="7a3e290c-eb83-484b-8e3d-d46ef2333477" providerId="ADAL" clId="{87C4268F-A9D7-4A74-8443-82093B86DEE8}" dt="2024-02-09T20:23:45.761" v="1897" actId="20577"/>
+          <ac:spMkLst>
+            <pc:docMk/>
+            <pc:sldMk cId="2860464347" sldId="405"/>
+            <ac:spMk id="2" creationId="{CD327056-086E-0BAA-BFC7-E2DB65B42AB8}"/>
+          </ac:spMkLst>
+        </pc:spChg>
         <pc:spChg chg="add mod">
           <ac:chgData name="Adrien Osakwe" userId="7a3e290c-eb83-484b-8e3d-d46ef2333477" providerId="ADAL" clId="{87C4268F-A9D7-4A74-8443-82093B86DEE8}" dt="2024-02-09T04:08:43.044" v="1047" actId="20577"/>
           <ac:spMkLst>
@@ -27454,7 +27462,7 @@
             </a:pPr>
             <a:r>
               <a:rPr lang="en-CA" b="1" dirty="0"/>
-              <a:t>Cloning a Repository</a:t>
+              <a:t>Forking a Repository</a:t>
             </a:r>
           </a:p>
         </p:txBody>

</xml_diff>